<commit_message>
Added QR to GitHub repo
</commit_message>
<xml_diff>
--- a/Checker Framework.pptx
+++ b/Checker Framework.pptx
@@ -254,7 +254,7 @@
           <a:p>
             <a:fld id="{3532B83F-F844-4C18-98E8-7C33F4B39DE0}" type="datetimeFigureOut">
               <a:rPr lang="nl-NL" smtClean="0"/>
-              <a:t>18-12-2019</a:t>
+              <a:t>10-1-2020</a:t>
             </a:fld>
             <a:endParaRPr lang="nl-NL"/>
           </a:p>
@@ -431,7 +431,7 @@
           <a:p>
             <a:fld id="{27396D34-C2B8-41FF-AE69-48AE3B3D8E8B}" type="datetimeFigureOut">
               <a:rPr lang="nl-NL" smtClean="0"/>
-              <a:t>18-12-2019</a:t>
+              <a:t>10-1-2020</a:t>
             </a:fld>
             <a:endParaRPr lang="nl-NL"/>
           </a:p>
@@ -25138,11 +25138,7 @@
           <a:p>
             <a:r>
               <a:rPr lang="en-US" dirty="0" smtClean="0"/>
-              <a:t>By Ingmar van der </a:t>
-            </a:r>
-            <a:r>
-              <a:rPr lang="en-US" dirty="0" smtClean="0"/>
-              <a:t>Steen</a:t>
+              <a:t>By Ingmar van der Steen</a:t>
             </a:r>
             <a:endParaRPr lang="en-US" dirty="0"/>
           </a:p>
@@ -31416,7 +31412,7 @@
 </file>
 
 <file path=ppt/slides/slide2.xml><?xml version="1.0" encoding="utf-8"?>
-<p:sld xmlns:a="http://schemas.openxmlformats.org/drawingml/2006/main" xmlns:r="http://schemas.openxmlformats.org/officeDocument/2006/relationships" xmlns:p="http://schemas.openxmlformats.org/presentationml/2006/main">
+<p:sld xmlns:a="http://schemas.openxmlformats.org/drawingml/2006/main" xmlns:r="http://schemas.openxmlformats.org/officeDocument/2006/relationships" xmlns:p="http://schemas.openxmlformats.org/presentationml/2006/main" show="0">
   <p:cSld>
     <p:spTree>
       <p:nvGrpSpPr>
@@ -33506,7 +33502,6 @@
               <a:rPr lang="en-US" dirty="0"/>
               <a:t> one?</a:t>
             </a:r>
-            <a:endParaRPr lang="en-US" dirty="0"/>
           </a:p>
         </p:txBody>
       </p:sp>
@@ -33958,6 +33953,30 @@
           </a:p>
         </p:txBody>
       </p:sp>
+      <p:pic>
+        <p:nvPicPr>
+          <p:cNvPr id="4" name="Picture 3"/>
+          <p:cNvPicPr>
+            <a:picLocks noChangeAspect="1"/>
+          </p:cNvPicPr>
+          <p:nvPr/>
+        </p:nvPicPr>
+        <p:blipFill>
+          <a:blip r:embed="rId2"/>
+          <a:stretch>
+            <a:fillRect/>
+          </a:stretch>
+        </p:blipFill>
+        <p:spPr>
+          <a:xfrm>
+            <a:off x="5461237" y="3319237"/>
+            <a:ext cx="1533525" cy="1533525"/>
+          </a:xfrm>
+          <a:prstGeom prst="rect">
+            <a:avLst/>
+          </a:prstGeom>
+        </p:spPr>
+      </p:pic>
       <p:sp>
         <p:nvSpPr>
           <p:cNvPr id="3" name="Text Placeholder 2"/>
@@ -33973,7 +33992,7 @@
           <a:bodyPr/>
           <a:lstStyle/>
           <a:p>
-            <a:endParaRPr lang="en-US"/>
+            <a:endParaRPr lang="en-US" dirty="0"/>
           </a:p>
         </p:txBody>
       </p:sp>
@@ -33987,6 +34006,13 @@
   <p:clrMapOvr>
     <a:masterClrMapping/>
   </p:clrMapOvr>
+  <p:timing>
+    <p:tnLst>
+      <p:par>
+        <p:cTn id="1" dur="indefinite" restart="never" nodeType="tmRoot"/>
+      </p:par>
+    </p:tnLst>
+  </p:timing>
 </p:sld>
 </file>
 
@@ -37334,6 +37360,12 @@
 </file>
 
 <file path=customXml/item1.xml><?xml version="1.0" encoding="utf-8"?>
+<p:properties xmlns:p="http://schemas.microsoft.com/office/2006/metadata/properties" xmlns:xsi="http://www.w3.org/2001/XMLSchema-instance" xmlns:pc="http://schemas.microsoft.com/office/infopath/2007/PartnerControls">
+  <documentManagement/>
+</p:properties>
+</file>
+
+<file path=customXml/item2.xml><?xml version="1.0" encoding="utf-8"?>
 <ct:contentTypeSchema xmlns:ct="http://schemas.microsoft.com/office/2006/metadata/contentType" xmlns:ma="http://schemas.microsoft.com/office/2006/metadata/properties/metaAttributes" ct:_="" ma:_="" ma:contentTypeName="Document" ma:contentTypeID="0x0101000858805C9A31ED4698AA5994F7540466" ma:contentTypeVersion="1" ma:contentTypeDescription="Een nieuw document maken." ma:contentTypeScope="" ma:versionID="5cab34e6f8d54d32c51f192539e9981c">
   <xsd:schema xmlns:xsd="http://www.w3.org/2001/XMLSchema" xmlns:xs="http://www.w3.org/2001/XMLSchema" xmlns:p="http://schemas.microsoft.com/office/2006/metadata/properties" xmlns:ns2="a73fd6a0-a740-4ca0-a47f-6beba88ccc77" targetNamespace="http://schemas.microsoft.com/office/2006/metadata/properties" ma:root="true" ma:fieldsID="10b3ae9c115bae24efdfd9076c93080b" ns2:_="">
     <xsd:import namespace="a73fd6a0-a740-4ca0-a47f-6beba88ccc77"/>
@@ -37473,12 +37505,6 @@
 </ct:contentTypeSchema>
 </file>
 
-<file path=customXml/item2.xml><?xml version="1.0" encoding="utf-8"?>
-<p:properties xmlns:p="http://schemas.microsoft.com/office/2006/metadata/properties" xmlns:xsi="http://www.w3.org/2001/XMLSchema-instance" xmlns:pc="http://schemas.microsoft.com/office/infopath/2007/PartnerControls">
-  <documentManagement/>
-</p:properties>
-</file>
-
 <file path=customXml/item3.xml><?xml version="1.0" encoding="utf-8"?>
 <?mso-contentType ?>
 <FormTemplates xmlns="http://schemas.microsoft.com/sharepoint/v3/contenttype/forms">
@@ -37489,6 +37515,15 @@
 </file>
 
 <file path=customXml/itemProps1.xml><?xml version="1.0" encoding="utf-8"?>
+<ds:datastoreItem xmlns:ds="http://schemas.openxmlformats.org/officeDocument/2006/customXml" ds:itemID="{F8AE8C2F-0717-4D42-B44A-CAECCF122A1A}">
+  <ds:schemaRefs>
+    <ds:schemaRef ds:uri="http://schemas.microsoft.com/office/2006/metadata/properties"/>
+    <ds:schemaRef ds:uri="http://schemas.microsoft.com/office/infopath/2007/PartnerControls"/>
+  </ds:schemaRefs>
+</ds:datastoreItem>
+</file>
+
+<file path=customXml/itemProps2.xml><?xml version="1.0" encoding="utf-8"?>
 <ds:datastoreItem xmlns:ds="http://schemas.openxmlformats.org/officeDocument/2006/customXml" ds:itemID="{9AC0CDE9-3E35-44FD-A63A-9795CF527D47}">
   <ds:schemaRefs>
     <ds:schemaRef ds:uri="http://schemas.microsoft.com/office/2006/metadata/contentType"/>
@@ -37506,15 +37541,6 @@
 </ds:datastoreItem>
 </file>
 
-<file path=customXml/itemProps2.xml><?xml version="1.0" encoding="utf-8"?>
-<ds:datastoreItem xmlns:ds="http://schemas.openxmlformats.org/officeDocument/2006/customXml" ds:itemID="{F8AE8C2F-0717-4D42-B44A-CAECCF122A1A}">
-  <ds:schemaRefs>
-    <ds:schemaRef ds:uri="http://schemas.microsoft.com/office/2006/metadata/properties"/>
-    <ds:schemaRef ds:uri="http://schemas.microsoft.com/office/infopath/2007/PartnerControls"/>
-  </ds:schemaRefs>
-</ds:datastoreItem>
-</file>
-
 <file path=customXml/itemProps3.xml><?xml version="1.0" encoding="utf-8"?>
 <ds:datastoreItem xmlns:ds="http://schemas.openxmlformats.org/officeDocument/2006/customXml" ds:itemID="{4522A51C-073F-4C45-9170-ECE5951F4DEA}">
   <ds:schemaRefs>

</xml_diff>